<commit_message>
Update for Y19 L15 foils
</commit_message>
<xml_diff>
--- a/mipt-mips/2019/L15/Lecture 15 - TLP - part 1.pptx
+++ b/mipt-mips/2019/L15/Lecture 15 - TLP - part 1.pptx
@@ -207,7 +207,7 @@
           <a:p>
             <a:fld id="{BF8A01DF-72FC-44AC-AB17-13BCF95A9755}" type="datetimeFigureOut">
               <a:rPr lang="ru-RU" smtClean="0"/>
-              <a:t>29.03.2020</a:t>
+              <a:t>30.03.2020</a:t>
             </a:fld>
             <a:endParaRPr lang="ru-RU"/>
           </a:p>
@@ -6920,13 +6920,13 @@
   <p:clrMapOvr>
     <a:masterClrMapping/>
   </p:clrMapOvr>
-  <mc:AlternateContent xmlns:mc="http://schemas.openxmlformats.org/markup-compatibility/2006">
-    <mc:Choice xmlns:p14="http://schemas.microsoft.com/office/powerpoint/2010/main" Requires="p14">
+  <mc:AlternateContent xmlns:mc="http://schemas.openxmlformats.org/markup-compatibility/2006" xmlns:p14="http://schemas.microsoft.com/office/powerpoint/2010/main">
+    <mc:Choice Requires="p14">
       <p:transition spd="med" p14:dur="700">
         <p:fade/>
       </p:transition>
     </mc:Choice>
-    <mc:Fallback>
+    <mc:Fallback xmlns="">
       <p:transition spd="med">
         <p:fade/>
       </p:transition>
@@ -6990,13 +6990,13 @@
   <p:clrMapOvr>
     <a:masterClrMapping/>
   </p:clrMapOvr>
-  <mc:AlternateContent xmlns:mc="http://schemas.openxmlformats.org/markup-compatibility/2006">
-    <mc:Choice xmlns:p14="http://schemas.microsoft.com/office/powerpoint/2010/main" Requires="p14">
+  <mc:AlternateContent xmlns:mc="http://schemas.openxmlformats.org/markup-compatibility/2006" xmlns:p14="http://schemas.microsoft.com/office/powerpoint/2010/main">
+    <mc:Choice Requires="p14">
       <p:transition spd="med" p14:dur="700">
         <p:fade/>
       </p:transition>
     </mc:Choice>
-    <mc:Fallback>
+    <mc:Fallback xmlns="">
       <p:transition spd="med">
         <p:fade/>
       </p:transition>
@@ -7432,13 +7432,13 @@
   <p:clrMapOvr>
     <a:masterClrMapping/>
   </p:clrMapOvr>
-  <mc:AlternateContent xmlns:mc="http://schemas.openxmlformats.org/markup-compatibility/2006">
-    <mc:Choice xmlns:p14="http://schemas.microsoft.com/office/powerpoint/2010/main" Requires="p14">
+  <mc:AlternateContent xmlns:mc="http://schemas.openxmlformats.org/markup-compatibility/2006" xmlns:p14="http://schemas.microsoft.com/office/powerpoint/2010/main">
+    <mc:Choice Requires="p14">
       <p:transition spd="med" p14:dur="700">
         <p:fade/>
       </p:transition>
     </mc:Choice>
-    <mc:Fallback>
+    <mc:Fallback xmlns="">
       <p:transition spd="med">
         <p:fade/>
       </p:transition>
@@ -8363,13 +8363,13 @@
   <p:clrMapOvr>
     <a:masterClrMapping/>
   </p:clrMapOvr>
-  <mc:AlternateContent xmlns:mc="http://schemas.openxmlformats.org/markup-compatibility/2006">
-    <mc:Choice xmlns:p14="http://schemas.microsoft.com/office/powerpoint/2010/main" Requires="p14">
+  <mc:AlternateContent xmlns:mc="http://schemas.openxmlformats.org/markup-compatibility/2006" xmlns:p14="http://schemas.microsoft.com/office/powerpoint/2010/main">
+    <mc:Choice Requires="p14">
       <p:transition spd="med" p14:dur="700">
         <p:fade/>
       </p:transition>
     </mc:Choice>
-    <mc:Fallback>
+    <mc:Fallback xmlns="">
       <p:transition spd="med">
         <p:fade/>
       </p:transition>
@@ -8438,15 +8438,33 @@
                                   </p:childTnLst>
                                 </p:cTn>
                               </p:par>
+                            </p:childTnLst>
+                          </p:cTn>
+                        </p:par>
+                      </p:childTnLst>
+                    </p:cTn>
+                  </p:par>
+                  <p:par>
+                    <p:cTn id="8" fill="hold">
+                      <p:stCondLst>
+                        <p:cond delay="indefinite"/>
+                      </p:stCondLst>
+                      <p:childTnLst>
+                        <p:par>
+                          <p:cTn id="9" fill="hold">
+                            <p:stCondLst>
+                              <p:cond delay="0"/>
+                            </p:stCondLst>
+                            <p:childTnLst>
                               <p:par>
-                                <p:cTn id="8" presetID="10" presetClass="entr" presetSubtype="0" fill="hold" grpId="0" nodeType="withEffect">
+                                <p:cTn id="10" presetID="10" presetClass="entr" presetSubtype="0" fill="hold" grpId="0" nodeType="clickEffect">
                                   <p:stCondLst>
                                     <p:cond delay="0"/>
                                   </p:stCondLst>
                                   <p:childTnLst>
                                     <p:set>
                                       <p:cBhvr>
-                                        <p:cTn id="9" dur="1" fill="hold">
+                                        <p:cTn id="11" dur="1" fill="hold">
                                           <p:stCondLst>
                                             <p:cond delay="0"/>
                                           </p:stCondLst>
@@ -8468,54 +8486,11 @@
                                     </p:set>
                                     <p:animEffect transition="in" filter="fade">
                                       <p:cBhvr>
-                                        <p:cTn id="10" dur="500"/>
+                                        <p:cTn id="12" dur="500"/>
                                         <p:tgtEl>
                                           <p:spTgt spid="21507">
                                             <p:txEl>
                                               <p:pRg st="1" end="1"/>
-                                            </p:txEl>
-                                          </p:spTgt>
-                                        </p:tgtEl>
-                                      </p:cBhvr>
-                                    </p:animEffect>
-                                  </p:childTnLst>
-                                </p:cTn>
-                              </p:par>
-                              <p:par>
-                                <p:cTn id="11" presetID="10" presetClass="entr" presetSubtype="0" fill="hold" grpId="0" nodeType="withEffect">
-                                  <p:stCondLst>
-                                    <p:cond delay="0"/>
-                                  </p:stCondLst>
-                                  <p:childTnLst>
-                                    <p:set>
-                                      <p:cBhvr>
-                                        <p:cTn id="12" dur="1" fill="hold">
-                                          <p:stCondLst>
-                                            <p:cond delay="0"/>
-                                          </p:stCondLst>
-                                        </p:cTn>
-                                        <p:tgtEl>
-                                          <p:spTgt spid="21507">
-                                            <p:txEl>
-                                              <p:pRg st="2" end="2"/>
-                                            </p:txEl>
-                                          </p:spTgt>
-                                        </p:tgtEl>
-                                        <p:attrNameLst>
-                                          <p:attrName>style.visibility</p:attrName>
-                                        </p:attrNameLst>
-                                      </p:cBhvr>
-                                      <p:to>
-                                        <p:strVal val="visible"/>
-                                      </p:to>
-                                    </p:set>
-                                    <p:animEffect transition="in" filter="fade">
-                                      <p:cBhvr>
-                                        <p:cTn id="13" dur="500"/>
-                                        <p:tgtEl>
-                                          <p:spTgt spid="21507">
-                                            <p:txEl>
-                                              <p:pRg st="2" end="2"/>
                                             </p:txEl>
                                           </p:spTgt>
                                         </p:tgtEl>
@@ -8531,32 +8506,36 @@
                     </p:cTn>
                   </p:par>
                   <p:par>
-                    <p:cTn id="14" fill="hold">
+                    <p:cTn id="13" fill="hold">
                       <p:stCondLst>
                         <p:cond delay="indefinite"/>
                       </p:stCondLst>
                       <p:childTnLst>
                         <p:par>
-                          <p:cTn id="15" fill="hold">
+                          <p:cTn id="14" fill="hold">
                             <p:stCondLst>
                               <p:cond delay="0"/>
                             </p:stCondLst>
                             <p:childTnLst>
                               <p:par>
-                                <p:cTn id="16" presetID="10" presetClass="entr" presetSubtype="0" fill="hold" nodeType="clickEffect">
+                                <p:cTn id="15" presetID="10" presetClass="entr" presetSubtype="0" fill="hold" grpId="0" nodeType="clickEffect">
                                   <p:stCondLst>
                                     <p:cond delay="0"/>
                                   </p:stCondLst>
                                   <p:childTnLst>
                                     <p:set>
                                       <p:cBhvr>
-                                        <p:cTn id="17" dur="1" fill="hold">
+                                        <p:cTn id="16" dur="1" fill="hold">
                                           <p:stCondLst>
                                             <p:cond delay="0"/>
                                           </p:stCondLst>
                                         </p:cTn>
                                         <p:tgtEl>
-                                          <p:spTgt spid="3"/>
+                                          <p:spTgt spid="21507">
+                                            <p:txEl>
+                                              <p:pRg st="2" end="2"/>
+                                            </p:txEl>
+                                          </p:spTgt>
                                         </p:tgtEl>
                                         <p:attrNameLst>
                                           <p:attrName>style.visibility</p:attrName>
@@ -8568,9 +8547,13 @@
                                     </p:set>
                                     <p:animEffect transition="in" filter="fade">
                                       <p:cBhvr>
-                                        <p:cTn id="18" dur="500"/>
-                                        <p:tgtEl>
-                                          <p:spTgt spid="3"/>
+                                        <p:cTn id="17" dur="500"/>
+                                        <p:tgtEl>
+                                          <p:spTgt spid="21507">
+                                            <p:txEl>
+                                              <p:pRg st="2" end="2"/>
+                                            </p:txEl>
+                                          </p:spTgt>
                                         </p:tgtEl>
                                       </p:cBhvr>
                                     </p:animEffect>
@@ -8584,36 +8567,32 @@
                     </p:cTn>
                   </p:par>
                   <p:par>
-                    <p:cTn id="19" fill="hold">
+                    <p:cTn id="18" fill="hold">
                       <p:stCondLst>
                         <p:cond delay="indefinite"/>
                       </p:stCondLst>
                       <p:childTnLst>
                         <p:par>
-                          <p:cTn id="20" fill="hold">
+                          <p:cTn id="19" fill="hold">
                             <p:stCondLst>
                               <p:cond delay="0"/>
                             </p:stCondLst>
                             <p:childTnLst>
                               <p:par>
-                                <p:cTn id="21" presetID="10" presetClass="entr" presetSubtype="0" fill="hold" grpId="0" nodeType="clickEffect">
+                                <p:cTn id="20" presetID="10" presetClass="entr" presetSubtype="0" fill="hold" nodeType="clickEffect">
                                   <p:stCondLst>
                                     <p:cond delay="0"/>
                                   </p:stCondLst>
                                   <p:childTnLst>
                                     <p:set>
                                       <p:cBhvr>
-                                        <p:cTn id="22" dur="1" fill="hold">
+                                        <p:cTn id="21" dur="1" fill="hold">
                                           <p:stCondLst>
                                             <p:cond delay="0"/>
                                           </p:stCondLst>
                                         </p:cTn>
                                         <p:tgtEl>
-                                          <p:spTgt spid="21507">
-                                            <p:txEl>
-                                              <p:pRg st="3" end="3"/>
-                                            </p:txEl>
-                                          </p:spTgt>
+                                          <p:spTgt spid="3"/>
                                         </p:tgtEl>
                                         <p:attrNameLst>
                                           <p:attrName>style.visibility</p:attrName>
@@ -8625,13 +8604,9 @@
                                     </p:set>
                                     <p:animEffect transition="in" filter="fade">
                                       <p:cBhvr>
-                                        <p:cTn id="23" dur="500"/>
-                                        <p:tgtEl>
-                                          <p:spTgt spid="21507">
-                                            <p:txEl>
-                                              <p:pRg st="3" end="3"/>
-                                            </p:txEl>
-                                          </p:spTgt>
+                                        <p:cTn id="22" dur="500"/>
+                                        <p:tgtEl>
+                                          <p:spTgt spid="3"/>
                                         </p:tgtEl>
                                       </p:cBhvr>
                                     </p:animEffect>
@@ -8645,26 +8620,26 @@
                     </p:cTn>
                   </p:par>
                   <p:par>
-                    <p:cTn id="24" fill="hold">
+                    <p:cTn id="23" fill="hold">
                       <p:stCondLst>
                         <p:cond delay="indefinite"/>
                       </p:stCondLst>
                       <p:childTnLst>
                         <p:par>
-                          <p:cTn id="25" fill="hold">
+                          <p:cTn id="24" fill="hold">
                             <p:stCondLst>
                               <p:cond delay="0"/>
                             </p:stCondLst>
                             <p:childTnLst>
                               <p:par>
-                                <p:cTn id="26" presetID="10" presetClass="entr" presetSubtype="0" fill="hold" grpId="0" nodeType="clickEffect">
+                                <p:cTn id="25" presetID="10" presetClass="entr" presetSubtype="0" fill="hold" grpId="0" nodeType="clickEffect">
                                   <p:stCondLst>
                                     <p:cond delay="0"/>
                                   </p:stCondLst>
                                   <p:childTnLst>
                                     <p:set>
                                       <p:cBhvr>
-                                        <p:cTn id="27" dur="1" fill="hold">
+                                        <p:cTn id="26" dur="1" fill="hold">
                                           <p:stCondLst>
                                             <p:cond delay="0"/>
                                           </p:stCondLst>
@@ -8672,7 +8647,7 @@
                                         <p:tgtEl>
                                           <p:spTgt spid="21507">
                                             <p:txEl>
-                                              <p:pRg st="4" end="4"/>
+                                              <p:pRg st="3" end="3"/>
                                             </p:txEl>
                                           </p:spTgt>
                                         </p:tgtEl>
@@ -8686,48 +8661,13 @@
                                     </p:set>
                                     <p:animEffect transition="in" filter="fade">
                                       <p:cBhvr>
-                                        <p:cTn id="28" dur="500"/>
+                                        <p:cTn id="27" dur="500"/>
                                         <p:tgtEl>
                                           <p:spTgt spid="21507">
                                             <p:txEl>
-                                              <p:pRg st="4" end="4"/>
+                                              <p:pRg st="3" end="3"/>
                                             </p:txEl>
                                           </p:spTgt>
-                                        </p:tgtEl>
-                                      </p:cBhvr>
-                                    </p:animEffect>
-                                  </p:childTnLst>
-                                </p:cTn>
-                              </p:par>
-                              <p:par>
-                                <p:cTn id="29" presetID="10" presetClass="entr" presetSubtype="0" fill="hold" grpId="0" nodeType="withEffect">
-                                  <p:stCondLst>
-                                    <p:cond delay="0"/>
-                                  </p:stCondLst>
-                                  <p:childTnLst>
-                                    <p:set>
-                                      <p:cBhvr>
-                                        <p:cTn id="30" dur="1" fill="hold">
-                                          <p:stCondLst>
-                                            <p:cond delay="0"/>
-                                          </p:stCondLst>
-                                        </p:cTn>
-                                        <p:tgtEl>
-                                          <p:spTgt spid="7"/>
-                                        </p:tgtEl>
-                                        <p:attrNameLst>
-                                          <p:attrName>style.visibility</p:attrName>
-                                        </p:attrNameLst>
-                                      </p:cBhvr>
-                                      <p:to>
-                                        <p:strVal val="visible"/>
-                                      </p:to>
-                                    </p:set>
-                                    <p:animEffect transition="in" filter="fade">
-                                      <p:cBhvr>
-                                        <p:cTn id="31" dur="500"/>
-                                        <p:tgtEl>
-                                          <p:spTgt spid="7"/>
                                         </p:tgtEl>
                                       </p:cBhvr>
                                     </p:animEffect>
@@ -8741,26 +8681,26 @@
                     </p:cTn>
                   </p:par>
                   <p:par>
-                    <p:cTn id="32" fill="hold">
+                    <p:cTn id="28" fill="hold">
                       <p:stCondLst>
                         <p:cond delay="indefinite"/>
                       </p:stCondLst>
                       <p:childTnLst>
                         <p:par>
-                          <p:cTn id="33" fill="hold">
+                          <p:cTn id="29" fill="hold">
                             <p:stCondLst>
                               <p:cond delay="0"/>
                             </p:stCondLst>
                             <p:childTnLst>
                               <p:par>
-                                <p:cTn id="34" presetID="10" presetClass="entr" presetSubtype="0" fill="hold" grpId="0" nodeType="clickEffect">
+                                <p:cTn id="30" presetID="10" presetClass="entr" presetSubtype="0" fill="hold" grpId="0" nodeType="clickEffect">
                                   <p:stCondLst>
                                     <p:cond delay="0"/>
                                   </p:stCondLst>
                                   <p:childTnLst>
                                     <p:set>
                                       <p:cBhvr>
-                                        <p:cTn id="35" dur="1" fill="hold">
+                                        <p:cTn id="31" dur="1" fill="hold">
                                           <p:stCondLst>
                                             <p:cond delay="0"/>
                                           </p:stCondLst>
@@ -8768,7 +8708,7 @@
                                         <p:tgtEl>
                                           <p:spTgt spid="21507">
                                             <p:txEl>
-                                              <p:pRg st="5" end="5"/>
+                                              <p:pRg st="4" end="4"/>
                                             </p:txEl>
                                           </p:spTgt>
                                         </p:tgtEl>
@@ -8782,11 +8722,11 @@
                                     </p:set>
                                     <p:animEffect transition="in" filter="fade">
                                       <p:cBhvr>
-                                        <p:cTn id="36" dur="500"/>
+                                        <p:cTn id="32" dur="500"/>
                                         <p:tgtEl>
                                           <p:spTgt spid="21507">
                                             <p:txEl>
-                                              <p:pRg st="5" end="5"/>
+                                              <p:pRg st="4" end="4"/>
                                             </p:txEl>
                                           </p:spTgt>
                                         </p:tgtEl>
@@ -8796,20 +8736,20 @@
                                 </p:cTn>
                               </p:par>
                               <p:par>
-                                <p:cTn id="37" presetID="10" presetClass="entr" presetSubtype="0" fill="hold" grpId="0" nodeType="withEffect">
+                                <p:cTn id="33" presetID="10" presetClass="entr" presetSubtype="0" fill="hold" grpId="0" nodeType="withEffect">
                                   <p:stCondLst>
                                     <p:cond delay="0"/>
                                   </p:stCondLst>
                                   <p:childTnLst>
                                     <p:set>
                                       <p:cBhvr>
-                                        <p:cTn id="38" dur="1" fill="hold">
+                                        <p:cTn id="34" dur="1" fill="hold">
                                           <p:stCondLst>
                                             <p:cond delay="0"/>
                                           </p:stCondLst>
                                         </p:cTn>
                                         <p:tgtEl>
-                                          <p:spTgt spid="10"/>
+                                          <p:spTgt spid="7"/>
                                         </p:tgtEl>
                                         <p:attrNameLst>
                                           <p:attrName>style.visibility</p:attrName>
@@ -8821,9 +8761,9 @@
                                     </p:set>
                                     <p:animEffect transition="in" filter="fade">
                                       <p:cBhvr>
-                                        <p:cTn id="39" dur="500"/>
-                                        <p:tgtEl>
-                                          <p:spTgt spid="10"/>
+                                        <p:cTn id="35" dur="500"/>
+                                        <p:tgtEl>
+                                          <p:spTgt spid="7"/>
                                         </p:tgtEl>
                                       </p:cBhvr>
                                     </p:animEffect>
@@ -8837,26 +8777,122 @@
                     </p:cTn>
                   </p:par>
                   <p:par>
-                    <p:cTn id="40" fill="hold">
+                    <p:cTn id="36" fill="hold">
                       <p:stCondLst>
                         <p:cond delay="indefinite"/>
                       </p:stCondLst>
                       <p:childTnLst>
                         <p:par>
-                          <p:cTn id="41" fill="hold">
+                          <p:cTn id="37" fill="hold">
                             <p:stCondLst>
                               <p:cond delay="0"/>
                             </p:stCondLst>
                             <p:childTnLst>
                               <p:par>
-                                <p:cTn id="42" presetID="10" presetClass="entr" presetSubtype="0" fill="hold" grpId="0" nodeType="clickEffect">
+                                <p:cTn id="38" presetID="10" presetClass="entr" presetSubtype="0" fill="hold" grpId="0" nodeType="clickEffect">
                                   <p:stCondLst>
                                     <p:cond delay="0"/>
                                   </p:stCondLst>
                                   <p:childTnLst>
                                     <p:set>
                                       <p:cBhvr>
-                                        <p:cTn id="43" dur="1" fill="hold">
+                                        <p:cTn id="39" dur="1" fill="hold">
+                                          <p:stCondLst>
+                                            <p:cond delay="0"/>
+                                          </p:stCondLst>
+                                        </p:cTn>
+                                        <p:tgtEl>
+                                          <p:spTgt spid="21507">
+                                            <p:txEl>
+                                              <p:pRg st="5" end="5"/>
+                                            </p:txEl>
+                                          </p:spTgt>
+                                        </p:tgtEl>
+                                        <p:attrNameLst>
+                                          <p:attrName>style.visibility</p:attrName>
+                                        </p:attrNameLst>
+                                      </p:cBhvr>
+                                      <p:to>
+                                        <p:strVal val="visible"/>
+                                      </p:to>
+                                    </p:set>
+                                    <p:animEffect transition="in" filter="fade">
+                                      <p:cBhvr>
+                                        <p:cTn id="40" dur="500"/>
+                                        <p:tgtEl>
+                                          <p:spTgt spid="21507">
+                                            <p:txEl>
+                                              <p:pRg st="5" end="5"/>
+                                            </p:txEl>
+                                          </p:spTgt>
+                                        </p:tgtEl>
+                                      </p:cBhvr>
+                                    </p:animEffect>
+                                  </p:childTnLst>
+                                </p:cTn>
+                              </p:par>
+                              <p:par>
+                                <p:cTn id="41" presetID="10" presetClass="entr" presetSubtype="0" fill="hold" grpId="0" nodeType="withEffect">
+                                  <p:stCondLst>
+                                    <p:cond delay="0"/>
+                                  </p:stCondLst>
+                                  <p:childTnLst>
+                                    <p:set>
+                                      <p:cBhvr>
+                                        <p:cTn id="42" dur="1" fill="hold">
+                                          <p:stCondLst>
+                                            <p:cond delay="0"/>
+                                          </p:stCondLst>
+                                        </p:cTn>
+                                        <p:tgtEl>
+                                          <p:spTgt spid="10"/>
+                                        </p:tgtEl>
+                                        <p:attrNameLst>
+                                          <p:attrName>style.visibility</p:attrName>
+                                        </p:attrNameLst>
+                                      </p:cBhvr>
+                                      <p:to>
+                                        <p:strVal val="visible"/>
+                                      </p:to>
+                                    </p:set>
+                                    <p:animEffect transition="in" filter="fade">
+                                      <p:cBhvr>
+                                        <p:cTn id="43" dur="500"/>
+                                        <p:tgtEl>
+                                          <p:spTgt spid="10"/>
+                                        </p:tgtEl>
+                                      </p:cBhvr>
+                                    </p:animEffect>
+                                  </p:childTnLst>
+                                </p:cTn>
+                              </p:par>
+                            </p:childTnLst>
+                          </p:cTn>
+                        </p:par>
+                      </p:childTnLst>
+                    </p:cTn>
+                  </p:par>
+                  <p:par>
+                    <p:cTn id="44" fill="hold">
+                      <p:stCondLst>
+                        <p:cond delay="indefinite"/>
+                      </p:stCondLst>
+                      <p:childTnLst>
+                        <p:par>
+                          <p:cTn id="45" fill="hold">
+                            <p:stCondLst>
+                              <p:cond delay="0"/>
+                            </p:stCondLst>
+                            <p:childTnLst>
+                              <p:par>
+                                <p:cTn id="46" presetID="10" presetClass="entr" presetSubtype="0" fill="hold" grpId="0" nodeType="clickEffect">
+                                  <p:stCondLst>
+                                    <p:cond delay="0"/>
+                                  </p:stCondLst>
+                                  <p:childTnLst>
+                                    <p:set>
+                                      <p:cBhvr>
+                                        <p:cTn id="47" dur="1" fill="hold">
                                           <p:stCondLst>
                                             <p:cond delay="0"/>
                                           </p:stCondLst>
@@ -8878,7 +8914,7 @@
                                     </p:set>
                                     <p:animEffect transition="in" filter="fade">
                                       <p:cBhvr>
-                                        <p:cTn id="44" dur="500"/>
+                                        <p:cTn id="48" dur="500"/>
                                         <p:tgtEl>
                                           <p:spTgt spid="21507">
                                             <p:txEl>
@@ -9197,13 +9233,13 @@
   <p:clrMapOvr>
     <a:masterClrMapping/>
   </p:clrMapOvr>
-  <mc:AlternateContent xmlns:mc="http://schemas.openxmlformats.org/markup-compatibility/2006">
-    <mc:Choice xmlns:p14="http://schemas.microsoft.com/office/powerpoint/2010/main" Requires="p14">
+  <mc:AlternateContent xmlns:mc="http://schemas.openxmlformats.org/markup-compatibility/2006" xmlns:p14="http://schemas.microsoft.com/office/powerpoint/2010/main">
+    <mc:Choice Requires="p14">
       <p:transition spd="med" p14:dur="700">
         <p:fade/>
       </p:transition>
     </mc:Choice>
-    <mc:Fallback>
+    <mc:Fallback xmlns="">
       <p:transition spd="med">
         <p:fade/>
       </p:transition>
@@ -9864,13 +9900,13 @@
   <p:clrMapOvr>
     <a:masterClrMapping/>
   </p:clrMapOvr>
-  <mc:AlternateContent xmlns:mc="http://schemas.openxmlformats.org/markup-compatibility/2006">
-    <mc:Choice xmlns:p14="http://schemas.microsoft.com/office/powerpoint/2010/main" Requires="p14">
+  <mc:AlternateContent xmlns:mc="http://schemas.openxmlformats.org/markup-compatibility/2006" xmlns:p14="http://schemas.microsoft.com/office/powerpoint/2010/main">
+    <mc:Choice Requires="p14">
       <p:transition spd="med" p14:dur="700">
         <p:fade/>
       </p:transition>
     </mc:Choice>
-    <mc:Fallback>
+    <mc:Fallback xmlns="">
       <p:transition spd="med">
         <p:fade/>
       </p:transition>
@@ -11419,13 +11455,13 @@
   <p:clrMapOvr>
     <a:masterClrMapping/>
   </p:clrMapOvr>
-  <mc:AlternateContent xmlns:mc="http://schemas.openxmlformats.org/markup-compatibility/2006">
-    <mc:Choice xmlns:p14="http://schemas.microsoft.com/office/powerpoint/2010/main" Requires="p14">
+  <mc:AlternateContent xmlns:mc="http://schemas.openxmlformats.org/markup-compatibility/2006" xmlns:p14="http://schemas.microsoft.com/office/powerpoint/2010/main">
+    <mc:Choice Requires="p14">
       <p:transition spd="med" p14:dur="700">
         <p:fade/>
       </p:transition>
     </mc:Choice>
-    <mc:Fallback>
+    <mc:Fallback xmlns="">
       <p:transition spd="med">
         <p:fade/>
       </p:transition>
@@ -11623,33 +11659,15 @@
                                   </p:childTnLst>
                                 </p:cTn>
                               </p:par>
-                            </p:childTnLst>
-                          </p:cTn>
-                        </p:par>
-                      </p:childTnLst>
-                    </p:cTn>
-                  </p:par>
-                  <p:par>
-                    <p:cTn id="17" fill="hold">
-                      <p:stCondLst>
-                        <p:cond delay="indefinite"/>
-                      </p:stCondLst>
-                      <p:childTnLst>
-                        <p:par>
-                          <p:cTn id="18" fill="hold">
-                            <p:stCondLst>
-                              <p:cond delay="0"/>
-                            </p:stCondLst>
-                            <p:childTnLst>
                               <p:par>
-                                <p:cTn id="19" presetID="10" presetClass="entr" presetSubtype="0" fill="hold" nodeType="clickEffect">
+                                <p:cTn id="17" presetID="10" presetClass="entr" presetSubtype="0" fill="hold" nodeType="withEffect">
                                   <p:stCondLst>
                                     <p:cond delay="0"/>
                                   </p:stCondLst>
                                   <p:childTnLst>
                                     <p:set>
                                       <p:cBhvr>
-                                        <p:cTn id="20" dur="1" fill="hold">
+                                        <p:cTn id="18" dur="1" fill="hold">
                                           <p:stCondLst>
                                             <p:cond delay="0"/>
                                           </p:stCondLst>
@@ -11667,7 +11685,7 @@
                                     </p:set>
                                     <p:animEffect transition="in" filter="fade">
                                       <p:cBhvr>
-                                        <p:cTn id="21" dur="500"/>
+                                        <p:cTn id="19" dur="500"/>
                                         <p:tgtEl>
                                           <p:spTgt spid="23"/>
                                         </p:tgtEl>
@@ -11683,26 +11701,26 @@
                     </p:cTn>
                   </p:par>
                   <p:par>
-                    <p:cTn id="22" fill="hold">
+                    <p:cTn id="20" fill="hold">
                       <p:stCondLst>
                         <p:cond delay="indefinite"/>
                       </p:stCondLst>
                       <p:childTnLst>
                         <p:par>
-                          <p:cTn id="23" fill="hold">
+                          <p:cTn id="21" fill="hold">
                             <p:stCondLst>
                               <p:cond delay="0"/>
                             </p:stCondLst>
                             <p:childTnLst>
                               <p:par>
-                                <p:cTn id="24" presetID="10" presetClass="entr" presetSubtype="0" fill="hold" grpId="0" nodeType="clickEffect">
+                                <p:cTn id="22" presetID="10" presetClass="entr" presetSubtype="0" fill="hold" grpId="0" nodeType="clickEffect">
                                   <p:stCondLst>
                                     <p:cond delay="0"/>
                                   </p:stCondLst>
                                   <p:childTnLst>
                                     <p:set>
                                       <p:cBhvr>
-                                        <p:cTn id="25" dur="1" fill="hold">
+                                        <p:cTn id="23" dur="1" fill="hold">
                                           <p:stCondLst>
                                             <p:cond delay="0"/>
                                           </p:stCondLst>
@@ -11724,7 +11742,7 @@
                                     </p:set>
                                     <p:animEffect transition="in" filter="fade">
                                       <p:cBhvr>
-                                        <p:cTn id="26" dur="500"/>
+                                        <p:cTn id="24" dur="500"/>
                                         <p:tgtEl>
                                           <p:spTgt spid="3">
                                             <p:txEl>
@@ -11738,14 +11756,14 @@
                                 </p:cTn>
                               </p:par>
                               <p:par>
-                                <p:cTn id="27" presetID="10" presetClass="entr" presetSubtype="0" fill="hold" grpId="0" nodeType="withEffect">
+                                <p:cTn id="25" presetID="10" presetClass="entr" presetSubtype="0" fill="hold" grpId="0" nodeType="withEffect">
                                   <p:stCondLst>
                                     <p:cond delay="0"/>
                                   </p:stCondLst>
                                   <p:childTnLst>
                                     <p:set>
                                       <p:cBhvr>
-                                        <p:cTn id="28" dur="1" fill="hold">
+                                        <p:cTn id="26" dur="1" fill="hold">
                                           <p:stCondLst>
                                             <p:cond delay="0"/>
                                           </p:stCondLst>
@@ -11767,7 +11785,7 @@
                                     </p:set>
                                     <p:animEffect transition="in" filter="fade">
                                       <p:cBhvr>
-                                        <p:cTn id="29" dur="500"/>
+                                        <p:cTn id="27" dur="500"/>
                                         <p:tgtEl>
                                           <p:spTgt spid="3">
                                             <p:txEl>
@@ -11781,14 +11799,14 @@
                                 </p:cTn>
                               </p:par>
                               <p:par>
-                                <p:cTn id="30" presetID="10" presetClass="entr" presetSubtype="0" fill="hold" grpId="0" nodeType="withEffect">
+                                <p:cTn id="28" presetID="10" presetClass="entr" presetSubtype="0" fill="hold" grpId="0" nodeType="withEffect">
                                   <p:stCondLst>
                                     <p:cond delay="0"/>
                                   </p:stCondLst>
                                   <p:childTnLst>
                                     <p:set>
                                       <p:cBhvr>
-                                        <p:cTn id="31" dur="1" fill="hold">
+                                        <p:cTn id="29" dur="1" fill="hold">
                                           <p:stCondLst>
                                             <p:cond delay="0"/>
                                           </p:stCondLst>
@@ -11810,7 +11828,7 @@
                                     </p:set>
                                     <p:animEffect transition="in" filter="fade">
                                       <p:cBhvr>
-                                        <p:cTn id="32" dur="500"/>
+                                        <p:cTn id="30" dur="500"/>
                                         <p:tgtEl>
                                           <p:spTgt spid="3">
                                             <p:txEl>
@@ -11824,14 +11842,14 @@
                                 </p:cTn>
                               </p:par>
                               <p:par>
-                                <p:cTn id="33" presetID="10" presetClass="entr" presetSubtype="0" fill="hold" grpId="0" nodeType="withEffect">
+                                <p:cTn id="31" presetID="10" presetClass="entr" presetSubtype="0" fill="hold" grpId="0" nodeType="withEffect">
                                   <p:stCondLst>
                                     <p:cond delay="0"/>
                                   </p:stCondLst>
                                   <p:childTnLst>
                                     <p:set>
                                       <p:cBhvr>
-                                        <p:cTn id="34" dur="1" fill="hold">
+                                        <p:cTn id="32" dur="1" fill="hold">
                                           <p:stCondLst>
                                             <p:cond delay="0"/>
                                           </p:stCondLst>
@@ -11853,7 +11871,7 @@
                                     </p:set>
                                     <p:animEffect transition="in" filter="fade">
                                       <p:cBhvr>
-                                        <p:cTn id="35" dur="500"/>
+                                        <p:cTn id="33" dur="500"/>
                                         <p:tgtEl>
                                           <p:spTgt spid="3">
                                             <p:txEl>
@@ -11866,33 +11884,15 @@
                                   </p:childTnLst>
                                 </p:cTn>
                               </p:par>
-                            </p:childTnLst>
-                          </p:cTn>
-                        </p:par>
-                      </p:childTnLst>
-                    </p:cTn>
-                  </p:par>
-                  <p:par>
-                    <p:cTn id="36" fill="hold">
-                      <p:stCondLst>
-                        <p:cond delay="indefinite"/>
-                      </p:stCondLst>
-                      <p:childTnLst>
-                        <p:par>
-                          <p:cTn id="37" fill="hold">
-                            <p:stCondLst>
-                              <p:cond delay="0"/>
-                            </p:stCondLst>
-                            <p:childTnLst>
                               <p:par>
-                                <p:cTn id="38" presetID="10" presetClass="entr" presetSubtype="0" fill="hold" nodeType="clickEffect">
+                                <p:cTn id="34" presetID="10" presetClass="entr" presetSubtype="0" fill="hold" nodeType="withEffect">
                                   <p:stCondLst>
                                     <p:cond delay="0"/>
                                   </p:stCondLst>
                                   <p:childTnLst>
                                     <p:set>
                                       <p:cBhvr>
-                                        <p:cTn id="39" dur="1" fill="hold">
+                                        <p:cTn id="35" dur="1" fill="hold">
                                           <p:stCondLst>
                                             <p:cond delay="0"/>
                                           </p:stCondLst>
@@ -11910,7 +11910,7 @@
                                     </p:set>
                                     <p:animEffect transition="in" filter="fade">
                                       <p:cBhvr>
-                                        <p:cTn id="40" dur="500"/>
+                                        <p:cTn id="36" dur="500"/>
                                         <p:tgtEl>
                                           <p:spTgt spid="24"/>
                                         </p:tgtEl>
@@ -17413,13 +17413,13 @@
   <p:clrMapOvr>
     <a:masterClrMapping/>
   </p:clrMapOvr>
-  <mc:AlternateContent xmlns:mc="http://schemas.openxmlformats.org/markup-compatibility/2006">
-    <mc:Choice xmlns:p14="http://schemas.microsoft.com/office/powerpoint/2010/main" Requires="p14">
+  <mc:AlternateContent xmlns:mc="http://schemas.openxmlformats.org/markup-compatibility/2006" xmlns:p14="http://schemas.microsoft.com/office/powerpoint/2010/main">
+    <mc:Choice Requires="p14">
       <p:transition spd="med" p14:dur="700">
         <p:fade/>
       </p:transition>
     </mc:Choice>
-    <mc:Fallback>
+    <mc:Fallback xmlns="">
       <p:transition spd="med">
         <p:fade/>
       </p:transition>
@@ -20238,13 +20238,13 @@
   <p:clrMapOvr>
     <a:masterClrMapping/>
   </p:clrMapOvr>
-  <mc:AlternateContent xmlns:mc="http://schemas.openxmlformats.org/markup-compatibility/2006">
-    <mc:Choice xmlns:p14="http://schemas.microsoft.com/office/powerpoint/2010/main" Requires="p14">
+  <mc:AlternateContent xmlns:mc="http://schemas.openxmlformats.org/markup-compatibility/2006" xmlns:p14="http://schemas.microsoft.com/office/powerpoint/2010/main">
+    <mc:Choice Requires="p14">
       <p:transition spd="med" p14:dur="700">
         <p:fade/>
       </p:transition>
     </mc:Choice>
-    <mc:Fallback>
+    <mc:Fallback xmlns="">
       <p:transition spd="med">
         <p:fade/>
       </p:transition>
@@ -25559,6 +25559,58 @@
           </a:p>
         </p:txBody>
       </p:sp>
+      <p:sp>
+        <p:nvSpPr>
+          <p:cNvPr id="3" name="Arrow: Right 2">
+            <a:extLst>
+              <a:ext uri="{FF2B5EF4-FFF2-40B4-BE49-F238E27FC236}">
+                <a16:creationId xmlns:a16="http://schemas.microsoft.com/office/drawing/2014/main" id="{8FF10E35-E45C-4A95-B451-47C4F5C60011}"/>
+              </a:ext>
+            </a:extLst>
+          </p:cNvPr>
+          <p:cNvSpPr/>
+          <p:nvPr/>
+        </p:nvSpPr>
+        <p:spPr>
+          <a:xfrm>
+            <a:off x="6777423" y="2873237"/>
+            <a:ext cx="707110" cy="461665"/>
+          </a:xfrm>
+          <a:prstGeom prst="rightArrow">
+            <a:avLst/>
+          </a:prstGeom>
+          <a:solidFill>
+            <a:srgbClr val="FF0000"/>
+          </a:solidFill>
+          <a:ln>
+            <a:noFill/>
+          </a:ln>
+        </p:spPr>
+        <p:style>
+          <a:lnRef idx="2">
+            <a:schemeClr val="accent1">
+              <a:shade val="50000"/>
+            </a:schemeClr>
+          </a:lnRef>
+          <a:fillRef idx="1">
+            <a:schemeClr val="accent1"/>
+          </a:fillRef>
+          <a:effectRef idx="0">
+            <a:schemeClr val="accent1"/>
+          </a:effectRef>
+          <a:fontRef idx="minor">
+            <a:schemeClr val="lt1"/>
+          </a:fontRef>
+        </p:style>
+        <p:txBody>
+          <a:bodyPr rtlCol="0" anchor="ctr"/>
+          <a:lstStyle/>
+          <a:p>
+            <a:pPr algn="ctr"/>
+            <a:endParaRPr lang="ru-RU"/>
+          </a:p>
+        </p:txBody>
+      </p:sp>
     </p:spTree>
     <p:extLst>
       <p:ext uri="{BB962C8B-B14F-4D97-AF65-F5344CB8AC3E}">
@@ -25569,13 +25621,13 @@
   <p:clrMapOvr>
     <a:masterClrMapping/>
   </p:clrMapOvr>
-  <mc:AlternateContent xmlns:mc="http://schemas.openxmlformats.org/markup-compatibility/2006">
-    <mc:Choice xmlns:p14="http://schemas.microsoft.com/office/powerpoint/2010/main" Requires="p14">
+  <mc:AlternateContent xmlns:mc="http://schemas.openxmlformats.org/markup-compatibility/2006" xmlns:p14="http://schemas.microsoft.com/office/powerpoint/2010/main">
+    <mc:Choice Requires="p14">
       <p:transition spd="med" p14:dur="700">
         <p:fade/>
       </p:transition>
     </mc:Choice>
-    <mc:Fallback>
+    <mc:Fallback xmlns="">
       <p:transition spd="med">
         <p:fade/>
       </p:transition>
@@ -25813,7 +25865,7 @@
                             </p:stCondLst>
                             <p:childTnLst>
                               <p:par>
-                                <p:cTn id="24" presetID="10" presetClass="entr" presetSubtype="0" fill="hold" nodeType="clickEffect">
+                                <p:cTn id="24" presetID="10" presetClass="entr" presetSubtype="0" fill="hold" grpId="0" nodeType="clickEffect">
                                   <p:stCondLst>
                                     <p:cond delay="0"/>
                                   </p:stCondLst>
@@ -25826,7 +25878,7 @@
                                           </p:stCondLst>
                                         </p:cTn>
                                         <p:tgtEl>
-                                          <p:spTgt spid="152"/>
+                                          <p:spTgt spid="68"/>
                                         </p:tgtEl>
                                         <p:attrNameLst>
                                           <p:attrName>style.visibility</p:attrName>
@@ -25840,7 +25892,7 @@
                                       <p:cBhvr>
                                         <p:cTn id="26" dur="500"/>
                                         <p:tgtEl>
-                                          <p:spTgt spid="152"/>
+                                          <p:spTgt spid="68"/>
                                         </p:tgtEl>
                                       </p:cBhvr>
                                     </p:animEffect>
@@ -25866,7 +25918,7 @@
                             </p:stCondLst>
                             <p:childTnLst>
                               <p:par>
-                                <p:cTn id="29" presetID="10" presetClass="entr" presetSubtype="0" fill="hold" nodeType="clickEffect">
+                                <p:cTn id="29" presetID="10" presetClass="entr" presetSubtype="0" fill="hold" grpId="0" nodeType="clickEffect">
                                   <p:stCondLst>
                                     <p:cond delay="0"/>
                                   </p:stCondLst>
@@ -25879,7 +25931,7 @@
                                           </p:stCondLst>
                                         </p:cTn>
                                         <p:tgtEl>
-                                          <p:spTgt spid="92"/>
+                                          <p:spTgt spid="69"/>
                                         </p:tgtEl>
                                         <p:attrNameLst>
                                           <p:attrName>style.visibility</p:attrName>
@@ -25893,7 +25945,7 @@
                                       <p:cBhvr>
                                         <p:cTn id="31" dur="500"/>
                                         <p:tgtEl>
-                                          <p:spTgt spid="92"/>
+                                          <p:spTgt spid="69"/>
                                         </p:tgtEl>
                                       </p:cBhvr>
                                     </p:animEffect>
@@ -25919,7 +25971,7 @@
                             </p:stCondLst>
                             <p:childTnLst>
                               <p:par>
-                                <p:cTn id="34" presetID="10" presetClass="entr" presetSubtype="0" fill="hold" nodeType="clickEffect">
+                                <p:cTn id="34" presetID="10" presetClass="entr" presetSubtype="0" fill="hold" grpId="0" nodeType="clickEffect">
                                   <p:stCondLst>
                                     <p:cond delay="0"/>
                                   </p:stCondLst>
@@ -25932,7 +25984,7 @@
                                           </p:stCondLst>
                                         </p:cTn>
                                         <p:tgtEl>
-                                          <p:spTgt spid="154"/>
+                                          <p:spTgt spid="70"/>
                                         </p:tgtEl>
                                         <p:attrNameLst>
                                           <p:attrName>style.visibility</p:attrName>
@@ -25946,7 +25998,7 @@
                                       <p:cBhvr>
                                         <p:cTn id="36" dur="500"/>
                                         <p:tgtEl>
-                                          <p:spTgt spid="154"/>
+                                          <p:spTgt spid="70"/>
                                         </p:tgtEl>
                                       </p:cBhvr>
                                     </p:animEffect>
@@ -25972,7 +26024,7 @@
                             </p:stCondLst>
                             <p:childTnLst>
                               <p:par>
-                                <p:cTn id="39" presetID="10" presetClass="entr" presetSubtype="0" fill="hold" grpId="0" nodeType="clickEffect">
+                                <p:cTn id="39" presetID="10" presetClass="entr" presetSubtype="0" fill="hold" grpId="3" nodeType="clickEffect">
                                   <p:stCondLst>
                                     <p:cond delay="0"/>
                                   </p:stCondLst>
@@ -25985,7 +26037,7 @@
                                           </p:stCondLst>
                                         </p:cTn>
                                         <p:tgtEl>
-                                          <p:spTgt spid="38"/>
+                                          <p:spTgt spid="3"/>
                                         </p:tgtEl>
                                         <p:attrNameLst>
                                           <p:attrName>style.visibility</p:attrName>
@@ -25999,42 +26051,7 @@
                                       <p:cBhvr>
                                         <p:cTn id="41" dur="500"/>
                                         <p:tgtEl>
-                                          <p:spTgt spid="38"/>
-                                        </p:tgtEl>
-                                      </p:cBhvr>
-                                    </p:animEffect>
-                                  </p:childTnLst>
-                                </p:cTn>
-                              </p:par>
-                              <p:par>
-                                <p:cTn id="42" presetID="10" presetClass="entr" presetSubtype="0" fill="hold" nodeType="withEffect">
-                                  <p:stCondLst>
-                                    <p:cond delay="0"/>
-                                  </p:stCondLst>
-                                  <p:childTnLst>
-                                    <p:set>
-                                      <p:cBhvr>
-                                        <p:cTn id="43" dur="1" fill="hold">
-                                          <p:stCondLst>
-                                            <p:cond delay="0"/>
-                                          </p:stCondLst>
-                                        </p:cTn>
-                                        <p:tgtEl>
-                                          <p:spTgt spid="32"/>
-                                        </p:tgtEl>
-                                        <p:attrNameLst>
-                                          <p:attrName>style.visibility</p:attrName>
-                                        </p:attrNameLst>
-                                      </p:cBhvr>
-                                      <p:to>
-                                        <p:strVal val="visible"/>
-                                      </p:to>
-                                    </p:set>
-                                    <p:animEffect transition="in" filter="fade">
-                                      <p:cBhvr>
-                                        <p:cTn id="44" dur="500"/>
-                                        <p:tgtEl>
-                                          <p:spTgt spid="32"/>
+                                          <p:spTgt spid="3"/>
                                         </p:tgtEl>
                                       </p:cBhvr>
                                     </p:animEffect>
@@ -26048,32 +26065,32 @@
                     </p:cTn>
                   </p:par>
                   <p:par>
-                    <p:cTn id="45" fill="hold">
+                    <p:cTn id="42" fill="hold">
                       <p:stCondLst>
                         <p:cond delay="indefinite"/>
                       </p:stCondLst>
                       <p:childTnLst>
                         <p:par>
-                          <p:cTn id="46" fill="hold">
+                          <p:cTn id="43" fill="hold">
                             <p:stCondLst>
                               <p:cond delay="0"/>
                             </p:stCondLst>
                             <p:childTnLst>
                               <p:par>
-                                <p:cTn id="47" presetID="10" presetClass="entr" presetSubtype="0" fill="hold" nodeType="clickEffect">
+                                <p:cTn id="44" presetID="10" presetClass="entr" presetSubtype="0" fill="hold" nodeType="clickEffect">
                                   <p:stCondLst>
                                     <p:cond delay="0"/>
                                   </p:stCondLst>
                                   <p:childTnLst>
                                     <p:set>
                                       <p:cBhvr>
-                                        <p:cTn id="48" dur="1" fill="hold">
+                                        <p:cTn id="45" dur="1" fill="hold">
                                           <p:stCondLst>
                                             <p:cond delay="0"/>
                                           </p:stCondLst>
                                         </p:cTn>
                                         <p:tgtEl>
-                                          <p:spTgt spid="96"/>
+                                          <p:spTgt spid="152"/>
                                         </p:tgtEl>
                                         <p:attrNameLst>
                                           <p:attrName>style.visibility</p:attrName>
@@ -26085,9 +26102,9 @@
                                     </p:set>
                                     <p:animEffect transition="in" filter="fade">
                                       <p:cBhvr>
-                                        <p:cTn id="49" dur="500"/>
-                                        <p:tgtEl>
-                                          <p:spTgt spid="96"/>
+                                        <p:cTn id="46" dur="500"/>
+                                        <p:tgtEl>
+                                          <p:spTgt spid="152"/>
                                         </p:tgtEl>
                                       </p:cBhvr>
                                     </p:animEffect>
@@ -26101,32 +26118,32 @@
                     </p:cTn>
                   </p:par>
                   <p:par>
-                    <p:cTn id="50" fill="hold">
+                    <p:cTn id="47" fill="hold">
                       <p:stCondLst>
                         <p:cond delay="indefinite"/>
                       </p:stCondLst>
                       <p:childTnLst>
                         <p:par>
-                          <p:cTn id="51" fill="hold">
+                          <p:cTn id="48" fill="hold">
                             <p:stCondLst>
                               <p:cond delay="0"/>
                             </p:stCondLst>
                             <p:childTnLst>
                               <p:par>
-                                <p:cTn id="52" presetID="10" presetClass="entr" presetSubtype="0" fill="hold" grpId="0" nodeType="clickEffect">
+                                <p:cTn id="49" presetID="10" presetClass="entr" presetSubtype="0" fill="hold" nodeType="clickEffect">
                                   <p:stCondLst>
                                     <p:cond delay="0"/>
                                   </p:stCondLst>
                                   <p:childTnLst>
                                     <p:set>
                                       <p:cBhvr>
-                                        <p:cTn id="53" dur="1" fill="hold">
+                                        <p:cTn id="50" dur="1" fill="hold">
                                           <p:stCondLst>
                                             <p:cond delay="0"/>
                                           </p:stCondLst>
                                         </p:cTn>
                                         <p:tgtEl>
-                                          <p:spTgt spid="68"/>
+                                          <p:spTgt spid="92"/>
                                         </p:tgtEl>
                                         <p:attrNameLst>
                                           <p:attrName>style.visibility</p:attrName>
@@ -26138,9 +26155,9 @@
                                     </p:set>
                                     <p:animEffect transition="in" filter="fade">
                                       <p:cBhvr>
-                                        <p:cTn id="54" dur="500"/>
-                                        <p:tgtEl>
-                                          <p:spTgt spid="68"/>
+                                        <p:cTn id="51" dur="500"/>
+                                        <p:tgtEl>
+                                          <p:spTgt spid="92"/>
                                         </p:tgtEl>
                                       </p:cBhvr>
                                     </p:animEffect>
@@ -26154,32 +26171,32 @@
                     </p:cTn>
                   </p:par>
                   <p:par>
-                    <p:cTn id="55" fill="hold">
+                    <p:cTn id="52" fill="hold">
                       <p:stCondLst>
                         <p:cond delay="indefinite"/>
                       </p:stCondLst>
                       <p:childTnLst>
                         <p:par>
-                          <p:cTn id="56" fill="hold">
+                          <p:cTn id="53" fill="hold">
                             <p:stCondLst>
                               <p:cond delay="0"/>
                             </p:stCondLst>
                             <p:childTnLst>
                               <p:par>
-                                <p:cTn id="57" presetID="10" presetClass="entr" presetSubtype="0" fill="hold" nodeType="clickEffect">
+                                <p:cTn id="54" presetID="10" presetClass="entr" presetSubtype="0" fill="hold" nodeType="clickEffect">
                                   <p:stCondLst>
                                     <p:cond delay="0"/>
                                   </p:stCondLst>
                                   <p:childTnLst>
                                     <p:set>
                                       <p:cBhvr>
-                                        <p:cTn id="58" dur="1" fill="hold">
+                                        <p:cTn id="55" dur="1" fill="hold">
                                           <p:stCondLst>
                                             <p:cond delay="0"/>
                                           </p:stCondLst>
                                         </p:cTn>
                                         <p:tgtEl>
-                                          <p:spTgt spid="155"/>
+                                          <p:spTgt spid="154"/>
                                         </p:tgtEl>
                                         <p:attrNameLst>
                                           <p:attrName>style.visibility</p:attrName>
@@ -26191,9 +26208,9 @@
                                     </p:set>
                                     <p:animEffect transition="in" filter="fade">
                                       <p:cBhvr>
-                                        <p:cTn id="59" dur="500"/>
-                                        <p:tgtEl>
-                                          <p:spTgt spid="155"/>
+                                        <p:cTn id="56" dur="500"/>
+                                        <p:tgtEl>
+                                          <p:spTgt spid="154"/>
                                         </p:tgtEl>
                                       </p:cBhvr>
                                     </p:animEffect>
@@ -26207,32 +26224,67 @@
                     </p:cTn>
                   </p:par>
                   <p:par>
-                    <p:cTn id="60" fill="hold">
+                    <p:cTn id="57" fill="hold">
                       <p:stCondLst>
                         <p:cond delay="indefinite"/>
                       </p:stCondLst>
                       <p:childTnLst>
                         <p:par>
-                          <p:cTn id="61" fill="hold">
+                          <p:cTn id="58" fill="hold">
                             <p:stCondLst>
                               <p:cond delay="0"/>
                             </p:stCondLst>
                             <p:childTnLst>
                               <p:par>
-                                <p:cTn id="62" presetID="10" presetClass="entr" presetSubtype="0" fill="hold" nodeType="clickEffect">
+                                <p:cTn id="59" presetID="10" presetClass="entr" presetSubtype="0" fill="hold" grpId="0" nodeType="clickEffect">
                                   <p:stCondLst>
                                     <p:cond delay="0"/>
                                   </p:stCondLst>
                                   <p:childTnLst>
                                     <p:set>
                                       <p:cBhvr>
+                                        <p:cTn id="60" dur="1" fill="hold">
+                                          <p:stCondLst>
+                                            <p:cond delay="0"/>
+                                          </p:stCondLst>
+                                        </p:cTn>
+                                        <p:tgtEl>
+                                          <p:spTgt spid="38"/>
+                                        </p:tgtEl>
+                                        <p:attrNameLst>
+                                          <p:attrName>style.visibility</p:attrName>
+                                        </p:attrNameLst>
+                                      </p:cBhvr>
+                                      <p:to>
+                                        <p:strVal val="visible"/>
+                                      </p:to>
+                                    </p:set>
+                                    <p:animEffect transition="in" filter="fade">
+                                      <p:cBhvr>
+                                        <p:cTn id="61" dur="500"/>
+                                        <p:tgtEl>
+                                          <p:spTgt spid="38"/>
+                                        </p:tgtEl>
+                                      </p:cBhvr>
+                                    </p:animEffect>
+                                  </p:childTnLst>
+                                </p:cTn>
+                              </p:par>
+                              <p:par>
+                                <p:cTn id="62" presetID="10" presetClass="entr" presetSubtype="0" fill="hold" nodeType="withEffect">
+                                  <p:stCondLst>
+                                    <p:cond delay="0"/>
+                                  </p:stCondLst>
+                                  <p:childTnLst>
+                                    <p:set>
+                                      <p:cBhvr>
                                         <p:cTn id="63" dur="1" fill="hold">
                                           <p:stCondLst>
                                             <p:cond delay="0"/>
                                           </p:stCondLst>
                                         </p:cTn>
                                         <p:tgtEl>
-                                          <p:spTgt spid="156"/>
+                                          <p:spTgt spid="32"/>
                                         </p:tgtEl>
                                         <p:attrNameLst>
                                           <p:attrName>style.visibility</p:attrName>
@@ -26246,7 +26298,7 @@
                                       <p:cBhvr>
                                         <p:cTn id="64" dur="500"/>
                                         <p:tgtEl>
-                                          <p:spTgt spid="156"/>
+                                          <p:spTgt spid="32"/>
                                         </p:tgtEl>
                                       </p:cBhvr>
                                     </p:animEffect>
@@ -26285,7 +26337,7 @@
                                           </p:stCondLst>
                                         </p:cTn>
                                         <p:tgtEl>
-                                          <p:spTgt spid="89"/>
+                                          <p:spTgt spid="96"/>
                                         </p:tgtEl>
                                         <p:attrNameLst>
                                           <p:attrName>style.visibility</p:attrName>
@@ -26299,7 +26351,7 @@
                                       <p:cBhvr>
                                         <p:cTn id="69" dur="500"/>
                                         <p:tgtEl>
-                                          <p:spTgt spid="89"/>
+                                          <p:spTgt spid="96"/>
                                         </p:tgtEl>
                                       </p:cBhvr>
                                     </p:animEffect>
@@ -26325,20 +26377,60 @@
                             </p:stCondLst>
                             <p:childTnLst>
                               <p:par>
-                                <p:cTn id="72" presetID="10" presetClass="entr" presetSubtype="0" fill="hold" nodeType="clickEffect">
+                                <p:cTn id="72" presetID="42" presetClass="path" presetSubtype="0" accel="50000" decel="50000" fill="hold" grpId="0" nodeType="clickEffect">
+                                  <p:stCondLst>
+                                    <p:cond delay="0"/>
+                                  </p:stCondLst>
+                                  <p:childTnLst>
+                                    <p:animMotion origin="layout" path="M 4.16667E-6 3.7037E-6 L 4.16667E-6 0.04745 " pathEditMode="relative" rAng="0" ptsTypes="AA">
+                                      <p:cBhvr>
+                                        <p:cTn id="73" dur="500" fill="hold"/>
+                                        <p:tgtEl>
+                                          <p:spTgt spid="3"/>
+                                        </p:tgtEl>
+                                        <p:attrNameLst>
+                                          <p:attrName>ppt_x</p:attrName>
+                                          <p:attrName>ppt_y</p:attrName>
+                                        </p:attrNameLst>
+                                      </p:cBhvr>
+                                      <p:rCtr x="0" y="2361"/>
+                                    </p:animMotion>
+                                  </p:childTnLst>
+                                </p:cTn>
+                              </p:par>
+                            </p:childTnLst>
+                          </p:cTn>
+                        </p:par>
+                      </p:childTnLst>
+                    </p:cTn>
+                  </p:par>
+                  <p:par>
+                    <p:cTn id="74" fill="hold">
+                      <p:stCondLst>
+                        <p:cond delay="indefinite"/>
+                      </p:stCondLst>
+                      <p:childTnLst>
+                        <p:par>
+                          <p:cTn id="75" fill="hold">
+                            <p:stCondLst>
+                              <p:cond delay="0"/>
+                            </p:stCondLst>
+                            <p:childTnLst>
+                              <p:par>
+                                <p:cTn id="76" presetID="10" presetClass="entr" presetSubtype="0" fill="hold" nodeType="clickEffect">
                                   <p:stCondLst>
                                     <p:cond delay="0"/>
                                   </p:stCondLst>
                                   <p:childTnLst>
                                     <p:set>
                                       <p:cBhvr>
-                                        <p:cTn id="73" dur="1" fill="hold">
+                                        <p:cTn id="77" dur="1" fill="hold">
                                           <p:stCondLst>
                                             <p:cond delay="0"/>
                                           </p:stCondLst>
                                         </p:cTn>
                                         <p:tgtEl>
-                                          <p:spTgt spid="56"/>
+                                          <p:spTgt spid="155"/>
                                         </p:tgtEl>
                                         <p:attrNameLst>
                                           <p:attrName>style.visibility</p:attrName>
@@ -26350,44 +26442,9 @@
                                     </p:set>
                                     <p:animEffect transition="in" filter="fade">
                                       <p:cBhvr>
-                                        <p:cTn id="74" dur="500"/>
-                                        <p:tgtEl>
-                                          <p:spTgt spid="56"/>
-                                        </p:tgtEl>
-                                      </p:cBhvr>
-                                    </p:animEffect>
-                                  </p:childTnLst>
-                                </p:cTn>
-                              </p:par>
-                              <p:par>
-                                <p:cTn id="75" presetID="10" presetClass="entr" presetSubtype="0" fill="hold" grpId="0" nodeType="withEffect">
-                                  <p:stCondLst>
-                                    <p:cond delay="0"/>
-                                  </p:stCondLst>
-                                  <p:childTnLst>
-                                    <p:set>
-                                      <p:cBhvr>
-                                        <p:cTn id="76" dur="1" fill="hold">
-                                          <p:stCondLst>
-                                            <p:cond delay="0"/>
-                                          </p:stCondLst>
-                                        </p:cTn>
-                                        <p:tgtEl>
-                                          <p:spTgt spid="50"/>
-                                        </p:tgtEl>
-                                        <p:attrNameLst>
-                                          <p:attrName>style.visibility</p:attrName>
-                                        </p:attrNameLst>
-                                      </p:cBhvr>
-                                      <p:to>
-                                        <p:strVal val="visible"/>
-                                      </p:to>
-                                    </p:set>
-                                    <p:animEffect transition="in" filter="fade">
-                                      <p:cBhvr>
-                                        <p:cTn id="77" dur="500"/>
-                                        <p:tgtEl>
-                                          <p:spTgt spid="50"/>
+                                        <p:cTn id="78" dur="500"/>
+                                        <p:tgtEl>
+                                          <p:spTgt spid="155"/>
                                         </p:tgtEl>
                                       </p:cBhvr>
                                     </p:animEffect>
@@ -26401,32 +26458,32 @@
                     </p:cTn>
                   </p:par>
                   <p:par>
-                    <p:cTn id="78" fill="hold">
+                    <p:cTn id="79" fill="hold">
                       <p:stCondLst>
                         <p:cond delay="indefinite"/>
                       </p:stCondLst>
                       <p:childTnLst>
                         <p:par>
-                          <p:cTn id="79" fill="hold">
+                          <p:cTn id="80" fill="hold">
                             <p:stCondLst>
                               <p:cond delay="0"/>
                             </p:stCondLst>
                             <p:childTnLst>
                               <p:par>
-                                <p:cTn id="80" presetID="10" presetClass="entr" presetSubtype="0" fill="hold" grpId="0" nodeType="clickEffect">
+                                <p:cTn id="81" presetID="10" presetClass="entr" presetSubtype="0" fill="hold" nodeType="clickEffect">
                                   <p:stCondLst>
                                     <p:cond delay="0"/>
                                   </p:stCondLst>
                                   <p:childTnLst>
                                     <p:set>
                                       <p:cBhvr>
-                                        <p:cTn id="81" dur="1" fill="hold">
+                                        <p:cTn id="82" dur="1" fill="hold">
                                           <p:stCondLst>
                                             <p:cond delay="0"/>
                                           </p:stCondLst>
                                         </p:cTn>
                                         <p:tgtEl>
-                                          <p:spTgt spid="69"/>
+                                          <p:spTgt spid="156"/>
                                         </p:tgtEl>
                                         <p:attrNameLst>
                                           <p:attrName>style.visibility</p:attrName>
@@ -26438,9 +26495,9 @@
                                     </p:set>
                                     <p:animEffect transition="in" filter="fade">
                                       <p:cBhvr>
-                                        <p:cTn id="82" dur="500"/>
-                                        <p:tgtEl>
-                                          <p:spTgt spid="69"/>
+                                        <p:cTn id="83" dur="500"/>
+                                        <p:tgtEl>
+                                          <p:spTgt spid="156"/>
                                         </p:tgtEl>
                                       </p:cBhvr>
                                     </p:animEffect>
@@ -26454,32 +26511,32 @@
                     </p:cTn>
                   </p:par>
                   <p:par>
-                    <p:cTn id="83" fill="hold">
+                    <p:cTn id="84" fill="hold">
                       <p:stCondLst>
                         <p:cond delay="indefinite"/>
                       </p:stCondLst>
                       <p:childTnLst>
                         <p:par>
-                          <p:cTn id="84" fill="hold">
+                          <p:cTn id="85" fill="hold">
                             <p:stCondLst>
                               <p:cond delay="0"/>
                             </p:stCondLst>
                             <p:childTnLst>
                               <p:par>
-                                <p:cTn id="85" presetID="10" presetClass="entr" presetSubtype="0" fill="hold" nodeType="clickEffect">
+                                <p:cTn id="86" presetID="10" presetClass="entr" presetSubtype="0" fill="hold" nodeType="clickEffect">
                                   <p:stCondLst>
                                     <p:cond delay="0"/>
                                   </p:stCondLst>
                                   <p:childTnLst>
                                     <p:set>
                                       <p:cBhvr>
-                                        <p:cTn id="86" dur="1" fill="hold">
+                                        <p:cTn id="87" dur="1" fill="hold">
                                           <p:stCondLst>
                                             <p:cond delay="0"/>
                                           </p:stCondLst>
                                         </p:cTn>
                                         <p:tgtEl>
-                                          <p:spTgt spid="88"/>
+                                          <p:spTgt spid="89"/>
                                         </p:tgtEl>
                                         <p:attrNameLst>
                                           <p:attrName>style.visibility</p:attrName>
@@ -26491,9 +26548,9 @@
                                     </p:set>
                                     <p:animEffect transition="in" filter="fade">
                                       <p:cBhvr>
-                                        <p:cTn id="87" dur="500"/>
-                                        <p:tgtEl>
-                                          <p:spTgt spid="88"/>
+                                        <p:cTn id="88" dur="500"/>
+                                        <p:tgtEl>
+                                          <p:spTgt spid="89"/>
                                         </p:tgtEl>
                                       </p:cBhvr>
                                     </p:animEffect>
@@ -26507,32 +26564,32 @@
                     </p:cTn>
                   </p:par>
                   <p:par>
-                    <p:cTn id="88" fill="hold">
+                    <p:cTn id="89" fill="hold">
                       <p:stCondLst>
                         <p:cond delay="indefinite"/>
                       </p:stCondLst>
                       <p:childTnLst>
                         <p:par>
-                          <p:cTn id="89" fill="hold">
+                          <p:cTn id="90" fill="hold">
                             <p:stCondLst>
                               <p:cond delay="0"/>
                             </p:stCondLst>
                             <p:childTnLst>
                               <p:par>
-                                <p:cTn id="90" presetID="10" presetClass="entr" presetSubtype="0" fill="hold" nodeType="clickEffect">
+                                <p:cTn id="91" presetID="10" presetClass="entr" presetSubtype="0" fill="hold" nodeType="clickEffect">
                                   <p:stCondLst>
                                     <p:cond delay="0"/>
                                   </p:stCondLst>
                                   <p:childTnLst>
                                     <p:set>
                                       <p:cBhvr>
-                                        <p:cTn id="91" dur="1" fill="hold">
+                                        <p:cTn id="92" dur="1" fill="hold">
                                           <p:stCondLst>
                                             <p:cond delay="0"/>
                                           </p:stCondLst>
                                         </p:cTn>
                                         <p:tgtEl>
-                                          <p:spTgt spid="157"/>
+                                          <p:spTgt spid="56"/>
                                         </p:tgtEl>
                                         <p:attrNameLst>
                                           <p:attrName>style.visibility</p:attrName>
@@ -26544,9 +26601,44 @@
                                     </p:set>
                                     <p:animEffect transition="in" filter="fade">
                                       <p:cBhvr>
-                                        <p:cTn id="92" dur="500"/>
-                                        <p:tgtEl>
-                                          <p:spTgt spid="157"/>
+                                        <p:cTn id="93" dur="500"/>
+                                        <p:tgtEl>
+                                          <p:spTgt spid="56"/>
+                                        </p:tgtEl>
+                                      </p:cBhvr>
+                                    </p:animEffect>
+                                  </p:childTnLst>
+                                </p:cTn>
+                              </p:par>
+                              <p:par>
+                                <p:cTn id="94" presetID="10" presetClass="entr" presetSubtype="0" fill="hold" grpId="0" nodeType="withEffect">
+                                  <p:stCondLst>
+                                    <p:cond delay="0"/>
+                                  </p:stCondLst>
+                                  <p:childTnLst>
+                                    <p:set>
+                                      <p:cBhvr>
+                                        <p:cTn id="95" dur="1" fill="hold">
+                                          <p:stCondLst>
+                                            <p:cond delay="0"/>
+                                          </p:stCondLst>
+                                        </p:cTn>
+                                        <p:tgtEl>
+                                          <p:spTgt spid="50"/>
+                                        </p:tgtEl>
+                                        <p:attrNameLst>
+                                          <p:attrName>style.visibility</p:attrName>
+                                        </p:attrNameLst>
+                                      </p:cBhvr>
+                                      <p:to>
+                                        <p:strVal val="visible"/>
+                                      </p:to>
+                                    </p:set>
+                                    <p:animEffect transition="in" filter="fade">
+                                      <p:cBhvr>
+                                        <p:cTn id="96" dur="500"/>
+                                        <p:tgtEl>
+                                          <p:spTgt spid="50"/>
                                         </p:tgtEl>
                                       </p:cBhvr>
                                     </p:animEffect>
@@ -26560,84 +26652,36 @@
                     </p:cTn>
                   </p:par>
                   <p:par>
-                    <p:cTn id="93" fill="hold">
+                    <p:cTn id="97" fill="hold">
                       <p:stCondLst>
                         <p:cond delay="indefinite"/>
                       </p:stCondLst>
                       <p:childTnLst>
                         <p:par>
-                          <p:cTn id="94" fill="hold">
+                          <p:cTn id="98" fill="hold">
                             <p:stCondLst>
                               <p:cond delay="0"/>
                             </p:stCondLst>
                             <p:childTnLst>
                               <p:par>
-                                <p:cTn id="95" presetID="10" presetClass="entr" presetSubtype="0" fill="hold" grpId="0" nodeType="clickEffect">
+                                <p:cTn id="99" presetID="42" presetClass="path" presetSubtype="0" accel="50000" decel="50000" fill="hold" grpId="1" nodeType="clickEffect">
                                   <p:stCondLst>
                                     <p:cond delay="0"/>
                                   </p:stCondLst>
                                   <p:childTnLst>
-                                    <p:set>
-                                      <p:cBhvr>
-                                        <p:cTn id="96" dur="1" fill="hold">
-                                          <p:stCondLst>
-                                            <p:cond delay="0"/>
-                                          </p:stCondLst>
-                                        </p:cTn>
-                                        <p:tgtEl>
-                                          <p:spTgt spid="72"/>
+                                    <p:animMotion origin="layout" path="M 4.16667E-6 0.04745 L 4.16667E-6 0.09953 " pathEditMode="relative" rAng="0" ptsTypes="AA">
+                                      <p:cBhvr>
+                                        <p:cTn id="100" dur="500" fill="hold"/>
+                                        <p:tgtEl>
+                                          <p:spTgt spid="3"/>
                                         </p:tgtEl>
                                         <p:attrNameLst>
-                                          <p:attrName>style.visibility</p:attrName>
+                                          <p:attrName>ppt_x</p:attrName>
+                                          <p:attrName>ppt_y</p:attrName>
                                         </p:attrNameLst>
                                       </p:cBhvr>
-                                      <p:to>
-                                        <p:strVal val="visible"/>
-                                      </p:to>
-                                    </p:set>
-                                    <p:animEffect transition="in" filter="fade">
-                                      <p:cBhvr>
-                                        <p:cTn id="97" dur="500"/>
-                                        <p:tgtEl>
-                                          <p:spTgt spid="72"/>
-                                        </p:tgtEl>
-                                      </p:cBhvr>
-                                    </p:animEffect>
-                                  </p:childTnLst>
-                                </p:cTn>
-                              </p:par>
-                              <p:par>
-                                <p:cTn id="98" presetID="10" presetClass="entr" presetSubtype="0" fill="hold" nodeType="withEffect">
-                                  <p:stCondLst>
-                                    <p:cond delay="0"/>
-                                  </p:stCondLst>
-                                  <p:childTnLst>
-                                    <p:set>
-                                      <p:cBhvr>
-                                        <p:cTn id="99" dur="1" fill="hold">
-                                          <p:stCondLst>
-                                            <p:cond delay="0"/>
-                                          </p:stCondLst>
-                                        </p:cTn>
-                                        <p:tgtEl>
-                                          <p:spTgt spid="71"/>
-                                        </p:tgtEl>
-                                        <p:attrNameLst>
-                                          <p:attrName>style.visibility</p:attrName>
-                                        </p:attrNameLst>
-                                      </p:cBhvr>
-                                      <p:to>
-                                        <p:strVal val="visible"/>
-                                      </p:to>
-                                    </p:set>
-                                    <p:animEffect transition="in" filter="fade">
-                                      <p:cBhvr>
-                                        <p:cTn id="100" dur="500"/>
-                                        <p:tgtEl>
-                                          <p:spTgt spid="71"/>
-                                        </p:tgtEl>
-                                      </p:cBhvr>
-                                    </p:animEffect>
+                                      <p:rCtr x="0" y="2593"/>
+                                    </p:animMotion>
                                   </p:childTnLst>
                                 </p:cTn>
                               </p:par>
@@ -26673,7 +26717,7 @@
                                           </p:stCondLst>
                                         </p:cTn>
                                         <p:tgtEl>
-                                          <p:spTgt spid="94"/>
+                                          <p:spTgt spid="88"/>
                                         </p:tgtEl>
                                         <p:attrNameLst>
                                           <p:attrName>style.visibility</p:attrName>
@@ -26687,7 +26731,7 @@
                                       <p:cBhvr>
                                         <p:cTn id="105" dur="500"/>
                                         <p:tgtEl>
-                                          <p:spTgt spid="94"/>
+                                          <p:spTgt spid="88"/>
                                         </p:tgtEl>
                                       </p:cBhvr>
                                     </p:animEffect>
@@ -26713,7 +26757,7 @@
                             </p:stCondLst>
                             <p:childTnLst>
                               <p:par>
-                                <p:cTn id="108" presetID="10" presetClass="entr" presetSubtype="0" fill="hold" grpId="0" nodeType="clickEffect">
+                                <p:cTn id="108" presetID="10" presetClass="entr" presetSubtype="0" fill="hold" nodeType="clickEffect">
                                   <p:stCondLst>
                                     <p:cond delay="0"/>
                                   </p:stCondLst>
@@ -26726,7 +26770,7 @@
                                           </p:stCondLst>
                                         </p:cTn>
                                         <p:tgtEl>
-                                          <p:spTgt spid="70"/>
+                                          <p:spTgt spid="157"/>
                                         </p:tgtEl>
                                         <p:attrNameLst>
                                           <p:attrName>style.visibility</p:attrName>
@@ -26740,7 +26784,7 @@
                                       <p:cBhvr>
                                         <p:cTn id="110" dur="500"/>
                                         <p:tgtEl>
-                                          <p:spTgt spid="70"/>
+                                          <p:spTgt spid="157"/>
                                         </p:tgtEl>
                                       </p:cBhvr>
                                     </p:animEffect>
@@ -26766,7 +26810,7 @@
                             </p:stCondLst>
                             <p:childTnLst>
                               <p:par>
-                                <p:cTn id="113" presetID="10" presetClass="entr" presetSubtype="0" fill="hold" nodeType="clickEffect">
+                                <p:cTn id="113" presetID="10" presetClass="entr" presetSubtype="0" fill="hold" grpId="0" nodeType="clickEffect">
                                   <p:stCondLst>
                                     <p:cond delay="0"/>
                                   </p:stCondLst>
@@ -26779,7 +26823,7 @@
                                           </p:stCondLst>
                                         </p:cTn>
                                         <p:tgtEl>
-                                          <p:spTgt spid="158"/>
+                                          <p:spTgt spid="72"/>
                                         </p:tgtEl>
                                         <p:attrNameLst>
                                           <p:attrName>style.visibility</p:attrName>
@@ -26793,7 +26837,42 @@
                                       <p:cBhvr>
                                         <p:cTn id="115" dur="500"/>
                                         <p:tgtEl>
-                                          <p:spTgt spid="158"/>
+                                          <p:spTgt spid="72"/>
+                                        </p:tgtEl>
+                                      </p:cBhvr>
+                                    </p:animEffect>
+                                  </p:childTnLst>
+                                </p:cTn>
+                              </p:par>
+                              <p:par>
+                                <p:cTn id="116" presetID="10" presetClass="entr" presetSubtype="0" fill="hold" nodeType="withEffect">
+                                  <p:stCondLst>
+                                    <p:cond delay="0"/>
+                                  </p:stCondLst>
+                                  <p:childTnLst>
+                                    <p:set>
+                                      <p:cBhvr>
+                                        <p:cTn id="117" dur="1" fill="hold">
+                                          <p:stCondLst>
+                                            <p:cond delay="0"/>
+                                          </p:stCondLst>
+                                        </p:cTn>
+                                        <p:tgtEl>
+                                          <p:spTgt spid="71"/>
+                                        </p:tgtEl>
+                                        <p:attrNameLst>
+                                          <p:attrName>style.visibility</p:attrName>
+                                        </p:attrNameLst>
+                                      </p:cBhvr>
+                                      <p:to>
+                                        <p:strVal val="visible"/>
+                                      </p:to>
+                                    </p:set>
+                                    <p:animEffect transition="in" filter="fade">
+                                      <p:cBhvr>
+                                        <p:cTn id="118" dur="500"/>
+                                        <p:tgtEl>
+                                          <p:spTgt spid="71"/>
                                         </p:tgtEl>
                                       </p:cBhvr>
                                     </p:animEffect>
@@ -26807,32 +26886,32 @@
                     </p:cTn>
                   </p:par>
                   <p:par>
-                    <p:cTn id="116" fill="hold">
+                    <p:cTn id="119" fill="hold">
                       <p:stCondLst>
                         <p:cond delay="indefinite"/>
                       </p:stCondLst>
                       <p:childTnLst>
                         <p:par>
-                          <p:cTn id="117" fill="hold">
+                          <p:cTn id="120" fill="hold">
                             <p:stCondLst>
                               <p:cond delay="0"/>
                             </p:stCondLst>
                             <p:childTnLst>
                               <p:par>
-                                <p:cTn id="118" presetID="10" presetClass="entr" presetSubtype="0" fill="hold" nodeType="clickEffect">
+                                <p:cTn id="121" presetID="10" presetClass="entr" presetSubtype="0" fill="hold" nodeType="clickEffect">
                                   <p:stCondLst>
                                     <p:cond delay="0"/>
                                   </p:stCondLst>
                                   <p:childTnLst>
                                     <p:set>
                                       <p:cBhvr>
-                                        <p:cTn id="119" dur="1" fill="hold">
+                                        <p:cTn id="122" dur="1" fill="hold">
                                           <p:stCondLst>
                                             <p:cond delay="0"/>
                                           </p:stCondLst>
                                         </p:cTn>
                                         <p:tgtEl>
-                                          <p:spTgt spid="159"/>
+                                          <p:spTgt spid="94"/>
                                         </p:tgtEl>
                                         <p:attrNameLst>
                                           <p:attrName>style.visibility</p:attrName>
@@ -26844,9 +26923,9 @@
                                     </p:set>
                                     <p:animEffect transition="in" filter="fade">
                                       <p:cBhvr>
-                                        <p:cTn id="120" dur="500"/>
-                                        <p:tgtEl>
-                                          <p:spTgt spid="159"/>
+                                        <p:cTn id="123" dur="500"/>
+                                        <p:tgtEl>
+                                          <p:spTgt spid="94"/>
                                         </p:tgtEl>
                                       </p:cBhvr>
                                     </p:animEffect>
@@ -26860,32 +26939,72 @@
                     </p:cTn>
                   </p:par>
                   <p:par>
-                    <p:cTn id="121" fill="hold">
+                    <p:cTn id="124" fill="hold">
                       <p:stCondLst>
                         <p:cond delay="indefinite"/>
                       </p:stCondLst>
                       <p:childTnLst>
                         <p:par>
-                          <p:cTn id="122" fill="hold">
+                          <p:cTn id="125" fill="hold">
                             <p:stCondLst>
                               <p:cond delay="0"/>
                             </p:stCondLst>
                             <p:childTnLst>
                               <p:par>
-                                <p:cTn id="123" presetID="10" presetClass="entr" presetSubtype="0" fill="hold" nodeType="clickEffect">
+                                <p:cTn id="126" presetID="42" presetClass="path" presetSubtype="0" accel="50000" decel="50000" fill="hold" grpId="2" nodeType="clickEffect">
+                                  <p:stCondLst>
+                                    <p:cond delay="0"/>
+                                  </p:stCondLst>
+                                  <p:childTnLst>
+                                    <p:animMotion origin="layout" path="M 4.16667E-6 0.09953 L 4.16667E-6 0.15046 " pathEditMode="relative" rAng="0" ptsTypes="AA">
+                                      <p:cBhvr>
+                                        <p:cTn id="127" dur="500" fill="hold"/>
+                                        <p:tgtEl>
+                                          <p:spTgt spid="3"/>
+                                        </p:tgtEl>
+                                        <p:attrNameLst>
+                                          <p:attrName>ppt_x</p:attrName>
+                                          <p:attrName>ppt_y</p:attrName>
+                                        </p:attrNameLst>
+                                      </p:cBhvr>
+                                      <p:rCtr x="0" y="2546"/>
+                                    </p:animMotion>
+                                  </p:childTnLst>
+                                </p:cTn>
+                              </p:par>
+                            </p:childTnLst>
+                          </p:cTn>
+                        </p:par>
+                      </p:childTnLst>
+                    </p:cTn>
+                  </p:par>
+                  <p:par>
+                    <p:cTn id="128" fill="hold">
+                      <p:stCondLst>
+                        <p:cond delay="indefinite"/>
+                      </p:stCondLst>
+                      <p:childTnLst>
+                        <p:par>
+                          <p:cTn id="129" fill="hold">
+                            <p:stCondLst>
+                              <p:cond delay="0"/>
+                            </p:stCondLst>
+                            <p:childTnLst>
+                              <p:par>
+                                <p:cTn id="130" presetID="10" presetClass="entr" presetSubtype="0" fill="hold" nodeType="clickEffect">
                                   <p:stCondLst>
                                     <p:cond delay="0"/>
                                   </p:stCondLst>
                                   <p:childTnLst>
                                     <p:set>
                                       <p:cBhvr>
-                                        <p:cTn id="124" dur="1" fill="hold">
+                                        <p:cTn id="131" dur="1" fill="hold">
                                           <p:stCondLst>
                                             <p:cond delay="0"/>
                                           </p:stCondLst>
                                         </p:cTn>
                                         <p:tgtEl>
-                                          <p:spTgt spid="160"/>
+                                          <p:spTgt spid="158"/>
                                         </p:tgtEl>
                                         <p:attrNameLst>
                                           <p:attrName>style.visibility</p:attrName>
@@ -26897,9 +27016,9 @@
                                     </p:set>
                                     <p:animEffect transition="in" filter="fade">
                                       <p:cBhvr>
-                                        <p:cTn id="125" dur="500"/>
-                                        <p:tgtEl>
-                                          <p:spTgt spid="160"/>
+                                        <p:cTn id="132" dur="500"/>
+                                        <p:tgtEl>
+                                          <p:spTgt spid="158"/>
                                         </p:tgtEl>
                                       </p:cBhvr>
                                     </p:animEffect>
@@ -26913,32 +27032,32 @@
                     </p:cTn>
                   </p:par>
                   <p:par>
-                    <p:cTn id="126" fill="hold">
+                    <p:cTn id="133" fill="hold">
                       <p:stCondLst>
                         <p:cond delay="indefinite"/>
                       </p:stCondLst>
                       <p:childTnLst>
                         <p:par>
-                          <p:cTn id="127" fill="hold">
+                          <p:cTn id="134" fill="hold">
                             <p:stCondLst>
                               <p:cond delay="0"/>
                             </p:stCondLst>
                             <p:childTnLst>
                               <p:par>
-                                <p:cTn id="128" presetID="10" presetClass="entr" presetSubtype="0" fill="hold" nodeType="clickEffect">
+                                <p:cTn id="135" presetID="10" presetClass="entr" presetSubtype="0" fill="hold" nodeType="clickEffect">
                                   <p:stCondLst>
                                     <p:cond delay="0"/>
                                   </p:stCondLst>
                                   <p:childTnLst>
                                     <p:set>
                                       <p:cBhvr>
-                                        <p:cTn id="129" dur="1" fill="hold">
+                                        <p:cTn id="136" dur="1" fill="hold">
                                           <p:stCondLst>
                                             <p:cond delay="0"/>
                                           </p:stCondLst>
                                         </p:cTn>
                                         <p:tgtEl>
-                                          <p:spTgt spid="118"/>
+                                          <p:spTgt spid="159"/>
                                         </p:tgtEl>
                                         <p:attrNameLst>
                                           <p:attrName>style.visibility</p:attrName>
@@ -26950,7 +27069,113 @@
                                     </p:set>
                                     <p:animEffect transition="in" filter="fade">
                                       <p:cBhvr>
-                                        <p:cTn id="130" dur="500"/>
+                                        <p:cTn id="137" dur="500"/>
+                                        <p:tgtEl>
+                                          <p:spTgt spid="159"/>
+                                        </p:tgtEl>
+                                      </p:cBhvr>
+                                    </p:animEffect>
+                                  </p:childTnLst>
+                                </p:cTn>
+                              </p:par>
+                            </p:childTnLst>
+                          </p:cTn>
+                        </p:par>
+                      </p:childTnLst>
+                    </p:cTn>
+                  </p:par>
+                  <p:par>
+                    <p:cTn id="138" fill="hold">
+                      <p:stCondLst>
+                        <p:cond delay="indefinite"/>
+                      </p:stCondLst>
+                      <p:childTnLst>
+                        <p:par>
+                          <p:cTn id="139" fill="hold">
+                            <p:stCondLst>
+                              <p:cond delay="0"/>
+                            </p:stCondLst>
+                            <p:childTnLst>
+                              <p:par>
+                                <p:cTn id="140" presetID="10" presetClass="entr" presetSubtype="0" fill="hold" nodeType="clickEffect">
+                                  <p:stCondLst>
+                                    <p:cond delay="0"/>
+                                  </p:stCondLst>
+                                  <p:childTnLst>
+                                    <p:set>
+                                      <p:cBhvr>
+                                        <p:cTn id="141" dur="1" fill="hold">
+                                          <p:stCondLst>
+                                            <p:cond delay="0"/>
+                                          </p:stCondLst>
+                                        </p:cTn>
+                                        <p:tgtEl>
+                                          <p:spTgt spid="160"/>
+                                        </p:tgtEl>
+                                        <p:attrNameLst>
+                                          <p:attrName>style.visibility</p:attrName>
+                                        </p:attrNameLst>
+                                      </p:cBhvr>
+                                      <p:to>
+                                        <p:strVal val="visible"/>
+                                      </p:to>
+                                    </p:set>
+                                    <p:animEffect transition="in" filter="fade">
+                                      <p:cBhvr>
+                                        <p:cTn id="142" dur="500"/>
+                                        <p:tgtEl>
+                                          <p:spTgt spid="160"/>
+                                        </p:tgtEl>
+                                      </p:cBhvr>
+                                    </p:animEffect>
+                                  </p:childTnLst>
+                                </p:cTn>
+                              </p:par>
+                            </p:childTnLst>
+                          </p:cTn>
+                        </p:par>
+                      </p:childTnLst>
+                    </p:cTn>
+                  </p:par>
+                  <p:par>
+                    <p:cTn id="143" fill="hold">
+                      <p:stCondLst>
+                        <p:cond delay="indefinite"/>
+                      </p:stCondLst>
+                      <p:childTnLst>
+                        <p:par>
+                          <p:cTn id="144" fill="hold">
+                            <p:stCondLst>
+                              <p:cond delay="0"/>
+                            </p:stCondLst>
+                            <p:childTnLst>
+                              <p:par>
+                                <p:cTn id="145" presetID="10" presetClass="entr" presetSubtype="0" fill="hold" nodeType="clickEffect">
+                                  <p:stCondLst>
+                                    <p:cond delay="0"/>
+                                  </p:stCondLst>
+                                  <p:childTnLst>
+                                    <p:set>
+                                      <p:cBhvr>
+                                        <p:cTn id="146" dur="1" fill="hold">
+                                          <p:stCondLst>
+                                            <p:cond delay="0"/>
+                                          </p:stCondLst>
+                                        </p:cTn>
+                                        <p:tgtEl>
+                                          <p:spTgt spid="118"/>
+                                        </p:tgtEl>
+                                        <p:attrNameLst>
+                                          <p:attrName>style.visibility</p:attrName>
+                                        </p:attrNameLst>
+                                      </p:cBhvr>
+                                      <p:to>
+                                        <p:strVal val="visible"/>
+                                      </p:to>
+                                    </p:set>
+                                    <p:animEffect transition="in" filter="fade">
+                                      <p:cBhvr>
+                                        <p:cTn id="147" dur="500"/>
                                         <p:tgtEl>
                                           <p:spTgt spid="118"/>
                                         </p:tgtEl>
@@ -26960,14 +27185,14 @@
                                 </p:cTn>
                               </p:par>
                               <p:par>
-                                <p:cTn id="131" presetID="10" presetClass="entr" presetSubtype="0" fill="hold" grpId="0" nodeType="withEffect">
+                                <p:cTn id="148" presetID="10" presetClass="entr" presetSubtype="0" fill="hold" grpId="0" nodeType="withEffect">
                                   <p:stCondLst>
                                     <p:cond delay="0"/>
                                   </p:stCondLst>
                                   <p:childTnLst>
                                     <p:set>
                                       <p:cBhvr>
-                                        <p:cTn id="132" dur="1" fill="hold">
+                                        <p:cTn id="149" dur="1" fill="hold">
                                           <p:stCondLst>
                                             <p:cond delay="0"/>
                                           </p:stCondLst>
@@ -26985,7 +27210,7 @@
                                     </p:set>
                                     <p:animEffect transition="in" filter="fade">
                                       <p:cBhvr>
-                                        <p:cTn id="133" dur="500"/>
+                                        <p:cTn id="150" dur="500"/>
                                         <p:tgtEl>
                                           <p:spTgt spid="119"/>
                                         </p:tgtEl>
@@ -27034,6 +27259,10 @@
       <p:bldP spid="9" grpId="0" animBg="1"/>
       <p:bldP spid="8" grpId="0" animBg="1"/>
       <p:bldP spid="7" grpId="0" animBg="1"/>
+      <p:bldP spid="3" grpId="0" animBg="1"/>
+      <p:bldP spid="3" grpId="1" animBg="1"/>
+      <p:bldP spid="3" grpId="2" animBg="1"/>
+      <p:bldP spid="3" grpId="3" animBg="1"/>
     </p:bldLst>
   </p:timing>
 </p:sld>

</xml_diff>